<commit_message>
More changes to press
</commit_message>
<xml_diff>
--- a/Final_Presentation.pptx
+++ b/Final_Presentation.pptx
@@ -4956,7 +4956,6 @@
               <a:rPr lang="fr-FR" dirty="0" smtClean="0"/>
               <a:t>.</a:t>
             </a:r>
-            <a:endParaRPr lang="fr-FR" dirty="0" smtClean="0"/>
           </a:p>
         </p:txBody>
       </p:sp>
@@ -5244,11 +5243,7 @@
             <a:pPr algn="l"/>
             <a:r>
               <a:rPr lang="fr-CA" dirty="0" smtClean="0"/>
-              <a:t>Our </a:t>
-            </a:r>
-            <a:r>
-              <a:rPr lang="fr-CA" dirty="0" smtClean="0"/>
-              <a:t>Model – Unique Value proposition</a:t>
+              <a:t>Our Model – Unique Value proposition</a:t>
             </a:r>
             <a:endParaRPr lang="fr-FR" dirty="0"/>
           </a:p>
@@ -5508,7 +5503,6 @@
               <a:rPr lang="fr-FR" sz="2800" dirty="0" smtClean="0"/>
               <a:t> location.</a:t>
             </a:r>
-            <a:endParaRPr lang="fr-FR" sz="2800" dirty="0" smtClean="0"/>
           </a:p>
         </p:txBody>
       </p:sp>
@@ -5719,11 +5713,7 @@
             <a:pPr algn="l"/>
             <a:r>
               <a:rPr lang="fr-CA" dirty="0" smtClean="0"/>
-              <a:t>Our </a:t>
-            </a:r>
-            <a:r>
-              <a:rPr lang="fr-CA" dirty="0" smtClean="0"/>
-              <a:t>Model - Data</a:t>
+              <a:t>Our Model - Data</a:t>
             </a:r>
             <a:endParaRPr lang="fr-FR" dirty="0"/>
           </a:p>
@@ -6112,20 +6102,50 @@
           <a:chExt cx="0" cy="0"/>
         </a:xfrm>
       </p:grpSpPr>
-      <p:sp>
-        <p:nvSpPr>
-          <p:cNvPr id="4101" name="Rectangle 5"/>
-          <p:cNvSpPr>
-            <a:spLocks noGrp="1" noChangeArrowheads="1"/>
-          </p:cNvSpPr>
-          <p:nvPr>
-            <p:ph idx="1"/>
-          </p:nvPr>
-        </p:nvSpPr>
+      <p:pic>
+        <p:nvPicPr>
+          <p:cNvPr id="3" name="Picture 2" descr="Screen Shot 2014-09-05 at 12.13.19 AM.png"/>
+          <p:cNvPicPr>
+            <a:picLocks noChangeAspect="1"/>
+          </p:cNvPicPr>
+          <p:nvPr/>
+        </p:nvPicPr>
+        <p:blipFill>
+          <a:blip r:embed="rId4">
+            <a:extLst>
+              <a:ext uri="{28A0092B-C50C-407E-A947-70E740481C1C}">
+                <a14:useLocalDpi xmlns:a14="http://schemas.microsoft.com/office/drawing/2010/main" val="0"/>
+              </a:ext>
+            </a:extLst>
+          </a:blip>
+          <a:stretch>
+            <a:fillRect/>
+          </a:stretch>
+        </p:blipFill>
         <p:spPr>
           <a:xfrm>
-            <a:off x="457200" y="548680"/>
-            <a:ext cx="8229600" cy="5577483"/>
+            <a:off x="3275856" y="813799"/>
+            <a:ext cx="2917304" cy="5063473"/>
+          </a:xfrm>
+          <a:prstGeom prst="rect">
+            <a:avLst/>
+          </a:prstGeom>
+        </p:spPr>
+      </p:pic>
+      <p:sp>
+        <p:nvSpPr>
+          <p:cNvPr id="4101" name="Rectangle 5"/>
+          <p:cNvSpPr>
+            <a:spLocks noGrp="1" noChangeArrowheads="1"/>
+          </p:cNvSpPr>
+          <p:nvPr>
+            <p:ph idx="1"/>
+          </p:nvPr>
+        </p:nvSpPr>
+        <p:spPr>
+          <a:xfrm>
+            <a:off x="3131840" y="116632"/>
+            <a:ext cx="3240360" cy="536923"/>
           </a:xfrm>
           <a:noFill/>
           <a:ln/>

</xml_diff>